<commit_message>
added C++ directory and edited my homework
</commit_message>
<xml_diff>
--- a/english/planb/PlanB.pptx
+++ b/english/planb/PlanB.pptx
@@ -3,18 +3,19 @@
 <p:presentation xmlns:a="http://schemas.openxmlformats.org/drawingml/2006/main" xmlns:p="http://schemas.openxmlformats.org/presentationml/2006/main" xmlns:r="http://schemas.openxmlformats.org/officeDocument/2006/relationships" xmlns:p14="http://schemas.microsoft.com/office/powerpoint/2010/main" xmlns:p15="http://schemas.microsoft.com/office/powerpoint/2012/main" xmlns:mc="http://schemas.openxmlformats.org/markup-compatibility/2006">
   <p:sldMasterIdLst>
     <p:sldMasterId id="2147483648" r:id="rId2"/>
+    <p:sldMasterId id="2147483650" r:id="rId3"/>
   </p:sldMasterIdLst>
   <p:sldIdLst>
-    <p:sldId id="256" r:id="rId3"/>
-    <p:sldId id="257" r:id="rId4"/>
-    <p:sldId id="258" r:id="rId5"/>
-    <p:sldId id="259" r:id="rId6"/>
-    <p:sldId id="260" r:id="rId7"/>
-    <p:sldId id="261" r:id="rId8"/>
-    <p:sldId id="262" r:id="rId9"/>
-    <p:sldId id="263" r:id="rId10"/>
-    <p:sldId id="264" r:id="rId11"/>
-    <p:sldId id="265" r:id="rId12"/>
+    <p:sldId id="256" r:id="rId4"/>
+    <p:sldId id="257" r:id="rId5"/>
+    <p:sldId id="258" r:id="rId6"/>
+    <p:sldId id="259" r:id="rId7"/>
+    <p:sldId id="260" r:id="rId8"/>
+    <p:sldId id="261" r:id="rId9"/>
+    <p:sldId id="262" r:id="rId10"/>
+    <p:sldId id="263" r:id="rId11"/>
+    <p:sldId id="264" r:id="rId12"/>
+    <p:sldId id="265" r:id="rId13"/>
   </p:sldIdLst>
   <p:sldSz cx="10080625" cy="5670550"/>
   <p:notesSz cx="7559675" cy="10691813"/>
@@ -51,7 +52,7 @@
         <p:spPr>
           <a:xfrm>
             <a:off x="504000" y="226080"/>
-            <a:ext cx="9071640" cy="946440"/>
+            <a:ext cx="9071280" cy="946080"/>
           </a:xfrm>
           <a:prstGeom prst="rect">
             <a:avLst/>
@@ -91,7 +92,7 @@
         <p:spPr>
           <a:xfrm>
             <a:off x="504000" y="1326600"/>
-            <a:ext cx="9071640" cy="3288240"/>
+            <a:ext cx="9071280" cy="3287880"/>
           </a:xfrm>
           <a:prstGeom prst="rect">
             <a:avLst/>
@@ -128,7 +129,7 @@
             <a:spLocks noGrp="1"/>
           </p:cNvSpPr>
           <p:nvPr>
-            <p:ph type="ftr" idx="2"/>
+            <p:ph type="ftr" idx="1"/>
           </p:nvPr>
         </p:nvSpPr>
         <p:spPr/>
@@ -148,14 +149,14 @@
             <a:spLocks noGrp="1"/>
           </p:cNvSpPr>
           <p:nvPr>
-            <p:ph type="sldNum" idx="3"/>
+            <p:ph type="sldNum" idx="2"/>
           </p:nvPr>
         </p:nvSpPr>
         <p:spPr/>
         <p:txBody>
           <a:bodyPr/>
           <a:p>
-            <a:fld id="{EBBDB163-ABD6-44F0-A9BA-765FF152CCCC}" type="slidenum">
+            <a:fld id="{345884AE-E043-4608-AA74-B524BAF80EA5}" type="slidenum">
               <a:t>&lt;#&gt;</a:t>
             </a:fld>
           </a:p>
@@ -168,7 +169,7 @@
             <a:spLocks noGrp="1"/>
           </p:cNvSpPr>
           <p:nvPr>
-            <p:ph type="dt" idx="1"/>
+            <p:ph type="dt" idx="3"/>
           </p:nvPr>
         </p:nvSpPr>
         <p:spPr/>
@@ -189,7 +190,7 @@
 
 <file path=ppt/slideLayouts/slideLayout2.xml><?xml version="1.0" encoding="utf-8"?>
 <p:sldLayout xmlns:a="http://schemas.openxmlformats.org/drawingml/2006/main" xmlns:p="http://schemas.openxmlformats.org/presentationml/2006/main" xmlns:r="http://schemas.openxmlformats.org/officeDocument/2006/relationships" xmlns:p14="http://schemas.microsoft.com/office/powerpoint/2010/main" xmlns:p15="http://schemas.microsoft.com/office/powerpoint/2012/main" xmlns:mc="http://schemas.openxmlformats.org/markup-compatibility/2006" type="title" preserve="1">
-  <p:cSld name="Default">
+  <p:cSld name="Default 1">
     <p:spTree>
       <p:nvGrpSpPr>
         <p:cNvPr id="1" name=""/>
@@ -206,7 +207,7 @@
       </p:grpSpPr>
       <p:sp>
         <p:nvSpPr>
-          <p:cNvPr id="7" name="PlaceHolder 1"/>
+          <p:cNvPr id="12" name="PlaceHolder 1"/>
           <p:cNvSpPr>
             <a:spLocks noGrp="1"/>
           </p:cNvSpPr>
@@ -217,7 +218,7 @@
         <p:spPr>
           <a:xfrm>
             <a:off x="504000" y="226080"/>
-            <a:ext cx="9071640" cy="946440"/>
+            <a:ext cx="9071280" cy="946080"/>
           </a:xfrm>
           <a:prstGeom prst="rect">
             <a:avLst/>
@@ -246,7 +247,7 @@
       </p:sp>
       <p:sp>
         <p:nvSpPr>
-          <p:cNvPr id="8" name="PlaceHolder 2"/>
+          <p:cNvPr id="13" name="PlaceHolder 2"/>
           <p:cNvSpPr>
             <a:spLocks noGrp="1"/>
           </p:cNvSpPr>
@@ -257,7 +258,7 @@
         <p:spPr>
           <a:xfrm>
             <a:off x="504000" y="1326600"/>
-            <a:ext cx="9071640" cy="3288240"/>
+            <a:ext cx="9071280" cy="3287880"/>
           </a:xfrm>
           <a:prstGeom prst="rect">
             <a:avLst/>
@@ -291,7 +292,7 @@
             <a:spLocks noGrp="1"/>
           </p:cNvSpPr>
           <p:nvPr>
-            <p:ph type="ftr" idx="2"/>
+            <p:ph type="ftr" idx="4"/>
           </p:nvPr>
         </p:nvSpPr>
         <p:spPr/>
@@ -311,14 +312,14 @@
             <a:spLocks noGrp="1"/>
           </p:cNvSpPr>
           <p:nvPr>
-            <p:ph type="sldNum" idx="3"/>
+            <p:ph type="sldNum" idx="5"/>
           </p:nvPr>
         </p:nvSpPr>
         <p:spPr/>
         <p:txBody>
           <a:bodyPr/>
           <a:p>
-            <a:fld id="{574CBAC0-284A-44CC-89AB-FAB3B4439EBB}" type="slidenum">
+            <a:fld id="{5BBBCBD3-BE5D-466D-B73C-3F1653D4C225}" type="slidenum">
               <a:t>&lt;#&gt;</a:t>
             </a:fld>
           </a:p>
@@ -331,7 +332,7 @@
             <a:spLocks noGrp="1"/>
           </p:cNvSpPr>
           <p:nvPr>
-            <p:ph type="dt" idx="1"/>
+            <p:ph type="dt" idx="6"/>
           </p:nvPr>
         </p:nvSpPr>
         <p:spPr/>
@@ -380,7 +381,7 @@
         <p:spPr>
           <a:xfrm>
             <a:off x="504000" y="226080"/>
-            <a:ext cx="9071640" cy="946440"/>
+            <a:ext cx="9071280" cy="946080"/>
           </a:xfrm>
           <a:prstGeom prst="rect">
             <a:avLst/>
@@ -395,325 +396,19 @@
             <a:noAutofit/>
           </a:bodyPr>
           <a:p>
-            <a:pPr indent="0" algn="ctr">
+            <a:pPr indent="0">
               <a:buNone/>
             </a:pPr>
             <a:r>
-              <a:rPr b="0" lang="en-US" sz="4400" spc="-1" strike="noStrike">
+              <a:rPr b="0" lang="en-US" sz="1800" spc="-1" strike="noStrike">
                 <a:solidFill>
                   <a:srgbClr val="000000"/>
                 </a:solidFill>
                 <a:latin typeface="DejaVu Sans"/>
               </a:rPr>
-              <a:t>C</a:t>
-            </a:r>
-            <a:r>
-              <a:rPr b="0" lang="en-US" sz="4400" spc="-1" strike="noStrike">
-                <a:solidFill>
-                  <a:srgbClr val="000000"/>
-                </a:solidFill>
-                <a:latin typeface="DejaVu Sans"/>
-              </a:rPr>
-              <a:t>l</a:t>
-            </a:r>
-            <a:r>
-              <a:rPr b="0" lang="en-US" sz="4400" spc="-1" strike="noStrike">
-                <a:solidFill>
-                  <a:srgbClr val="000000"/>
-                </a:solidFill>
-                <a:latin typeface="DejaVu Sans"/>
-              </a:rPr>
-              <a:t>i</a:t>
-            </a:r>
-            <a:r>
-              <a:rPr b="0" lang="en-US" sz="4400" spc="-1" strike="noStrike">
-                <a:solidFill>
-                  <a:srgbClr val="000000"/>
-                </a:solidFill>
-                <a:latin typeface="DejaVu Sans"/>
-              </a:rPr>
-              <a:t>c</a:t>
-            </a:r>
-            <a:r>
-              <a:rPr b="0" lang="en-US" sz="4400" spc="-1" strike="noStrike">
-                <a:solidFill>
-                  <a:srgbClr val="000000"/>
-                </a:solidFill>
-                <a:latin typeface="DejaVu Sans"/>
-              </a:rPr>
-              <a:t>k</a:t>
-            </a:r>
-            <a:r>
-              <a:rPr b="0" lang="en-US" sz="4400" spc="-1" strike="noStrike">
-                <a:solidFill>
-                  <a:srgbClr val="000000"/>
-                </a:solidFill>
-                <a:latin typeface="DejaVu Sans"/>
-              </a:rPr>
-              <a:t> </a:t>
-            </a:r>
-            <a:r>
-              <a:rPr b="0" lang="en-US" sz="4400" spc="-1" strike="noStrike">
-                <a:solidFill>
-                  <a:srgbClr val="000000"/>
-                </a:solidFill>
-                <a:latin typeface="DejaVu Sans"/>
-              </a:rPr>
-              <a:t>t</a:t>
-            </a:r>
-            <a:r>
-              <a:rPr b="0" lang="en-US" sz="4400" spc="-1" strike="noStrike">
-                <a:solidFill>
-                  <a:srgbClr val="000000"/>
-                </a:solidFill>
-                <a:latin typeface="DejaVu Sans"/>
-              </a:rPr>
-              <a:t>o</a:t>
-            </a:r>
-            <a:r>
-              <a:rPr b="0" lang="en-US" sz="4400" spc="-1" strike="noStrike">
-                <a:solidFill>
-                  <a:srgbClr val="000000"/>
-                </a:solidFill>
-                <a:latin typeface="DejaVu Sans"/>
-              </a:rPr>
-              <a:t> </a:t>
-            </a:r>
-            <a:r>
-              <a:rPr b="0" lang="en-US" sz="4400" spc="-1" strike="noStrike">
-                <a:solidFill>
-                  <a:srgbClr val="000000"/>
-                </a:solidFill>
-                <a:latin typeface="DejaVu Sans"/>
-              </a:rPr>
-              <a:t>e</a:t>
-            </a:r>
-            <a:r>
-              <a:rPr b="0" lang="en-US" sz="4400" spc="-1" strike="noStrike">
-                <a:solidFill>
-                  <a:srgbClr val="000000"/>
-                </a:solidFill>
-                <a:latin typeface="DejaVu Sans"/>
-              </a:rPr>
-              <a:t>d</a:t>
-            </a:r>
-            <a:r>
-              <a:rPr b="0" lang="en-US" sz="4400" spc="-1" strike="noStrike">
-                <a:solidFill>
-                  <a:srgbClr val="000000"/>
-                </a:solidFill>
-                <a:latin typeface="DejaVu Sans"/>
-              </a:rPr>
-              <a:t>i</a:t>
-            </a:r>
-            <a:r>
-              <a:rPr b="0" lang="en-US" sz="4400" spc="-1" strike="noStrike">
-                <a:solidFill>
-                  <a:srgbClr val="000000"/>
-                </a:solidFill>
-                <a:latin typeface="DejaVu Sans"/>
-              </a:rPr>
-              <a:t>t</a:t>
-            </a:r>
-            <a:r>
-              <a:rPr b="0" lang="en-US" sz="4400" spc="-1" strike="noStrike">
-                <a:solidFill>
-                  <a:srgbClr val="000000"/>
-                </a:solidFill>
-                <a:latin typeface="DejaVu Sans"/>
-              </a:rPr>
-              <a:t> </a:t>
-            </a:r>
-            <a:r>
-              <a:rPr b="0" lang="en-US" sz="4400" spc="-1" strike="noStrike">
-                <a:solidFill>
-                  <a:srgbClr val="000000"/>
-                </a:solidFill>
-                <a:latin typeface="DejaVu Sans"/>
-              </a:rPr>
-              <a:t>t</a:t>
-            </a:r>
-            <a:r>
-              <a:rPr b="0" lang="en-US" sz="4400" spc="-1" strike="noStrike">
-                <a:solidFill>
-                  <a:srgbClr val="000000"/>
-                </a:solidFill>
-                <a:latin typeface="DejaVu Sans"/>
-              </a:rPr>
-              <a:t>h</a:t>
-            </a:r>
-            <a:r>
-              <a:rPr b="0" lang="en-US" sz="4400" spc="-1" strike="noStrike">
-                <a:solidFill>
-                  <a:srgbClr val="000000"/>
-                </a:solidFill>
-                <a:latin typeface="DejaVu Sans"/>
-              </a:rPr>
-              <a:t>e</a:t>
-            </a:r>
-            <a:r>
-              <a:rPr b="0" lang="en-US" sz="4400" spc="-1" strike="noStrike">
-                <a:solidFill>
-                  <a:srgbClr val="000000"/>
-                </a:solidFill>
-                <a:latin typeface="DejaVu Sans"/>
-              </a:rPr>
-              <a:t> </a:t>
-            </a:r>
-            <a:r>
-              <a:rPr b="0" lang="en-US" sz="4400" spc="-1" strike="noStrike">
-                <a:solidFill>
-                  <a:srgbClr val="000000"/>
-                </a:solidFill>
-                <a:latin typeface="DejaVu Sans"/>
-              </a:rPr>
-              <a:t>t</a:t>
-            </a:r>
-            <a:r>
-              <a:rPr b="0" lang="en-US" sz="4400" spc="-1" strike="noStrike">
-                <a:solidFill>
-                  <a:srgbClr val="000000"/>
-                </a:solidFill>
-                <a:latin typeface="DejaVu Sans"/>
-              </a:rPr>
-              <a:t>i</a:t>
-            </a:r>
-            <a:r>
-              <a:rPr b="0" lang="en-US" sz="4400" spc="-1" strike="noStrike">
-                <a:solidFill>
-                  <a:srgbClr val="000000"/>
-                </a:solidFill>
-                <a:latin typeface="DejaVu Sans"/>
-              </a:rPr>
-              <a:t>t</a:t>
-            </a:r>
-            <a:r>
-              <a:rPr b="0" lang="en-US" sz="4400" spc="-1" strike="noStrike">
-                <a:solidFill>
-                  <a:srgbClr val="000000"/>
-                </a:solidFill>
-                <a:latin typeface="DejaVu Sans"/>
-              </a:rPr>
-              <a:t>l</a:t>
-            </a:r>
-            <a:r>
-              <a:rPr b="0" lang="en-US" sz="4400" spc="-1" strike="noStrike">
-                <a:solidFill>
-                  <a:srgbClr val="000000"/>
-                </a:solidFill>
-                <a:latin typeface="DejaVu Sans"/>
-              </a:rPr>
-              <a:t>e</a:t>
-            </a:r>
-            <a:r>
-              <a:rPr b="0" lang="en-US" sz="4400" spc="-1" strike="noStrike">
-                <a:solidFill>
-                  <a:srgbClr val="000000"/>
-                </a:solidFill>
-                <a:latin typeface="DejaVu Sans"/>
-              </a:rPr>
-              <a:t> </a:t>
-            </a:r>
-            <a:r>
-              <a:rPr b="0" lang="en-US" sz="4400" spc="-1" strike="noStrike">
-                <a:solidFill>
-                  <a:srgbClr val="000000"/>
-                </a:solidFill>
-                <a:latin typeface="DejaVu Sans"/>
-              </a:rPr>
-              <a:t>t</a:t>
-            </a:r>
-            <a:r>
-              <a:rPr b="0" lang="en-US" sz="4400" spc="-1" strike="noStrike">
-                <a:solidFill>
-                  <a:srgbClr val="000000"/>
-                </a:solidFill>
-                <a:latin typeface="DejaVu Sans"/>
-              </a:rPr>
-              <a:t>e</a:t>
-            </a:r>
-            <a:r>
-              <a:rPr b="0" lang="en-US" sz="4400" spc="-1" strike="noStrike">
-                <a:solidFill>
-                  <a:srgbClr val="000000"/>
-                </a:solidFill>
-                <a:latin typeface="DejaVu Sans"/>
-              </a:rPr>
-              <a:t>x</a:t>
-            </a:r>
-            <a:r>
-              <a:rPr b="0" lang="en-US" sz="4400" spc="-1" strike="noStrike">
-                <a:solidFill>
-                  <a:srgbClr val="000000"/>
-                </a:solidFill>
-                <a:latin typeface="DejaVu Sans"/>
-              </a:rPr>
-              <a:t>t</a:t>
-            </a:r>
-            <a:r>
-              <a:rPr b="0" lang="en-US" sz="4400" spc="-1" strike="noStrike">
-                <a:solidFill>
-                  <a:srgbClr val="000000"/>
-                </a:solidFill>
-                <a:latin typeface="DejaVu Sans"/>
-              </a:rPr>
-              <a:t> </a:t>
-            </a:r>
-            <a:r>
-              <a:rPr b="0" lang="en-US" sz="4400" spc="-1" strike="noStrike">
-                <a:solidFill>
-                  <a:srgbClr val="000000"/>
-                </a:solidFill>
-                <a:latin typeface="DejaVu Sans"/>
-              </a:rPr>
-              <a:t>f</a:t>
-            </a:r>
-            <a:r>
-              <a:rPr b="0" lang="en-US" sz="4400" spc="-1" strike="noStrike">
-                <a:solidFill>
-                  <a:srgbClr val="000000"/>
-                </a:solidFill>
-                <a:latin typeface="DejaVu Sans"/>
-              </a:rPr>
-              <a:t>o</a:t>
-            </a:r>
-            <a:r>
-              <a:rPr b="0" lang="en-US" sz="4400" spc="-1" strike="noStrike">
-                <a:solidFill>
-                  <a:srgbClr val="000000"/>
-                </a:solidFill>
-                <a:latin typeface="DejaVu Sans"/>
-              </a:rPr>
-              <a:t>r</a:t>
-            </a:r>
-            <a:r>
-              <a:rPr b="0" lang="en-US" sz="4400" spc="-1" strike="noStrike">
-                <a:solidFill>
-                  <a:srgbClr val="000000"/>
-                </a:solidFill>
-                <a:latin typeface="DejaVu Sans"/>
-              </a:rPr>
-              <a:t>m</a:t>
-            </a:r>
-            <a:r>
-              <a:rPr b="0" lang="en-US" sz="4400" spc="-1" strike="noStrike">
-                <a:solidFill>
-                  <a:srgbClr val="000000"/>
-                </a:solidFill>
-                <a:latin typeface="DejaVu Sans"/>
-              </a:rPr>
-              <a:t>a</a:t>
-            </a:r>
-            <a:r>
-              <a:rPr b="0" lang="en-US" sz="4400" spc="-1" strike="noStrike">
-                <a:solidFill>
-                  <a:srgbClr val="000000"/>
-                </a:solidFill>
-                <a:latin typeface="DejaVu Sans"/>
-              </a:rPr>
-              <a:t>t</a:t>
-            </a:r>
-            <a:endParaRPr b="0" lang="en-US" sz="4400" spc="-1" strike="noStrike">
+              <a:t>Click to edit the title text format</a:t>
+            </a:r>
+            <a:endParaRPr b="0" lang="en-US" sz="1800" spc="-1" strike="noStrike">
               <a:solidFill>
                 <a:srgbClr val="000000"/>
               </a:solidFill>
@@ -735,7 +430,7 @@
         <p:spPr>
           <a:xfrm>
             <a:off x="504000" y="1326600"/>
-            <a:ext cx="9071640" cy="3288240"/>
+            <a:ext cx="9071280" cy="3287880"/>
           </a:xfrm>
           <a:prstGeom prst="rect">
             <a:avLst/>
@@ -762,7 +457,7 @@
               <a:buChar char=""/>
             </a:pPr>
             <a:r>
-              <a:rPr b="0" lang="en-US" sz="3200" spc="-1" strike="noStrike">
+              <a:rPr b="0" lang="en-US" sz="1800" spc="-1" strike="noStrike">
                 <a:solidFill>
                   <a:srgbClr val="000000"/>
                 </a:solidFill>
@@ -770,7 +465,7 @@
               </a:rPr>
               <a:t>Click to edit the outline text format</a:t>
             </a:r>
-            <a:endParaRPr b="0" lang="en-US" sz="3200" spc="-1" strike="noStrike">
+            <a:endParaRPr b="0" lang="en-US" sz="1800" spc="-1" strike="noStrike">
               <a:solidFill>
                 <a:srgbClr val="000000"/>
               </a:solidFill>
@@ -790,7 +485,7 @@
               <a:buChar char=""/>
             </a:pPr>
             <a:r>
-              <a:rPr b="0" lang="en-US" sz="2800" spc="-1" strike="noStrike">
+              <a:rPr b="0" lang="en-US" sz="1800" spc="-1" strike="noStrike">
                 <a:solidFill>
                   <a:srgbClr val="000000"/>
                 </a:solidFill>
@@ -798,7 +493,7 @@
               </a:rPr>
               <a:t>Second Outline Level</a:t>
             </a:r>
-            <a:endParaRPr b="0" lang="en-US" sz="2800" spc="-1" strike="noStrike">
+            <a:endParaRPr b="0" lang="en-US" sz="1800" spc="-1" strike="noStrike">
               <a:solidFill>
                 <a:srgbClr val="000000"/>
               </a:solidFill>
@@ -818,7 +513,7 @@
               <a:buChar char=""/>
             </a:pPr>
             <a:r>
-              <a:rPr b="0" lang="en-US" sz="2400" spc="-1" strike="noStrike">
+              <a:rPr b="0" lang="en-US" sz="1800" spc="-1" strike="noStrike">
                 <a:solidFill>
                   <a:srgbClr val="000000"/>
                 </a:solidFill>
@@ -826,7 +521,7 @@
               </a:rPr>
               <a:t>Third Outline Level</a:t>
             </a:r>
-            <a:endParaRPr b="0" lang="en-US" sz="2400" spc="-1" strike="noStrike">
+            <a:endParaRPr b="0" lang="en-US" sz="1800" spc="-1" strike="noStrike">
               <a:solidFill>
                 <a:srgbClr val="000000"/>
               </a:solidFill>
@@ -846,7 +541,7 @@
               <a:buChar char=""/>
             </a:pPr>
             <a:r>
-              <a:rPr b="0" lang="en-US" sz="2000" spc="-1" strike="noStrike">
+              <a:rPr b="0" lang="en-US" sz="1800" spc="-1" strike="noStrike">
                 <a:solidFill>
                   <a:srgbClr val="000000"/>
                 </a:solidFill>
@@ -854,7 +549,7 @@
               </a:rPr>
               <a:t>Fourth Outline Level</a:t>
             </a:r>
-            <a:endParaRPr b="0" lang="en-US" sz="2000" spc="-1" strike="noStrike">
+            <a:endParaRPr b="0" lang="en-US" sz="1800" spc="-1" strike="noStrike">
               <a:solidFill>
                 <a:srgbClr val="000000"/>
               </a:solidFill>
@@ -874,7 +569,7 @@
               <a:buChar char=""/>
             </a:pPr>
             <a:r>
-              <a:rPr b="0" lang="en-US" sz="2000" spc="-1" strike="noStrike">
+              <a:rPr b="0" lang="en-US" sz="1800" spc="-1" strike="noStrike">
                 <a:solidFill>
                   <a:srgbClr val="000000"/>
                 </a:solidFill>
@@ -882,7 +577,7 @@
               </a:rPr>
               <a:t>Fifth Outline Level</a:t>
             </a:r>
-            <a:endParaRPr b="0" lang="en-US" sz="2000" spc="-1" strike="noStrike">
+            <a:endParaRPr b="0" lang="en-US" sz="1800" spc="-1" strike="noStrike">
               <a:solidFill>
                 <a:srgbClr val="000000"/>
               </a:solidFill>
@@ -902,7 +597,7 @@
               <a:buChar char=""/>
             </a:pPr>
             <a:r>
-              <a:rPr b="0" lang="en-US" sz="2000" spc="-1" strike="noStrike">
+              <a:rPr b="0" lang="en-US" sz="1800" spc="-1" strike="noStrike">
                 <a:solidFill>
                   <a:srgbClr val="000000"/>
                 </a:solidFill>
@@ -910,7 +605,7 @@
               </a:rPr>
               <a:t>Sixth Outline Level</a:t>
             </a:r>
-            <a:endParaRPr b="0" lang="en-US" sz="2000" spc="-1" strike="noStrike">
+            <a:endParaRPr b="0" lang="en-US" sz="1800" spc="-1" strike="noStrike">
               <a:solidFill>
                 <a:srgbClr val="000000"/>
               </a:solidFill>
@@ -930,7 +625,7 @@
               <a:buChar char=""/>
             </a:pPr>
             <a:r>
-              <a:rPr b="0" lang="en-US" sz="2000" spc="-1" strike="noStrike">
+              <a:rPr b="0" lang="en-US" sz="1800" spc="-1" strike="noStrike">
                 <a:solidFill>
                   <a:srgbClr val="000000"/>
                 </a:solidFill>
@@ -938,7 +633,7 @@
               </a:rPr>
               <a:t>Seventh Outline Level</a:t>
             </a:r>
-            <a:endParaRPr b="0" lang="en-US" sz="2000" spc="-1" strike="noStrike">
+            <a:endParaRPr b="0" lang="en-US" sz="1800" spc="-1" strike="noStrike">
               <a:solidFill>
                 <a:srgbClr val="000000"/>
               </a:solidFill>
@@ -954,13 +649,13 @@
             <a:spLocks noGrp="1"/>
           </p:cNvSpPr>
           <p:nvPr>
-            <p:ph type="dt" idx="1"/>
+            <p:ph type="ftr" idx="1"/>
           </p:nvPr>
         </p:nvSpPr>
         <p:spPr>
           <a:xfrm>
-            <a:off x="504000" y="5165280"/>
-            <a:ext cx="2348280" cy="390600"/>
+            <a:off x="3447360" y="5165280"/>
+            <a:ext cx="3194640" cy="390240"/>
           </a:xfrm>
           <a:prstGeom prst="rect">
             <a:avLst/>
@@ -975,8 +670,14 @@
             <a:noAutofit/>
           </a:bodyPr>
           <a:lstStyle>
-            <a:lvl1pPr indent="0">
+            <a:lvl1pPr indent="0" algn="ctr">
+              <a:lnSpc>
+                <a:spcPct val="100000"/>
+              </a:lnSpc>
               <a:buNone/>
+              <a:tabLst>
+                <a:tab algn="l" pos="0"/>
+              </a:tabLst>
               <a:defRPr b="0" lang="en-US" sz="1400" spc="-1" strike="noStrike">
                 <a:solidFill>
                   <a:srgbClr val="000000"/>
@@ -986,8 +687,14 @@
             </a:lvl1pPr>
           </a:lstStyle>
           <a:p>
-            <a:pPr indent="0">
+            <a:pPr indent="0" algn="ctr">
+              <a:lnSpc>
+                <a:spcPct val="100000"/>
+              </a:lnSpc>
               <a:buNone/>
+              <a:tabLst>
+                <a:tab algn="l" pos="0"/>
+              </a:tabLst>
             </a:pPr>
             <a:r>
               <a:rPr b="0" lang="en-US" sz="1400" spc="-1" strike="noStrike">
@@ -996,7 +703,7 @@
                 </a:solidFill>
                 <a:latin typeface="DejaVu Serif"/>
               </a:rPr>
-              <a:t>&lt;date/time&gt;</a:t>
+              <a:t>&lt;footer&gt;</a:t>
             </a:r>
             <a:endParaRPr b="0" lang="en-US" sz="1400" spc="-1" strike="noStrike">
               <a:solidFill>
@@ -1014,13 +721,13 @@
             <a:spLocks noGrp="1"/>
           </p:cNvSpPr>
           <p:nvPr>
-            <p:ph type="ftr" idx="2"/>
+            <p:ph type="sldNum" idx="2"/>
           </p:nvPr>
         </p:nvSpPr>
         <p:spPr>
           <a:xfrm>
-            <a:off x="3447360" y="5165280"/>
-            <a:ext cx="3195000" cy="390600"/>
+            <a:off x="7227360" y="5165280"/>
+            <a:ext cx="2347920" cy="390240"/>
           </a:xfrm>
           <a:prstGeom prst="rect">
             <a:avLst/>
@@ -1035,8 +742,14 @@
             <a:noAutofit/>
           </a:bodyPr>
           <a:lstStyle>
-            <a:lvl1pPr indent="0" algn="ctr">
+            <a:lvl1pPr indent="0" algn="r">
+              <a:lnSpc>
+                <a:spcPct val="100000"/>
+              </a:lnSpc>
               <a:buNone/>
+              <a:tabLst>
+                <a:tab algn="l" pos="0"/>
+              </a:tabLst>
               <a:defRPr b="0" lang="en-US" sz="1400" spc="-1" strike="noStrike">
                 <a:solidFill>
                   <a:srgbClr val="000000"/>
@@ -1046,18 +759,24 @@
             </a:lvl1pPr>
           </a:lstStyle>
           <a:p>
-            <a:pPr indent="0" algn="ctr">
+            <a:pPr indent="0" algn="r">
+              <a:lnSpc>
+                <a:spcPct val="100000"/>
+              </a:lnSpc>
               <a:buNone/>
-            </a:pPr>
-            <a:r>
+              <a:tabLst>
+                <a:tab algn="l" pos="0"/>
+              </a:tabLst>
+            </a:pPr>
+            <a:fld id="{FC526D89-6B61-4F11-95F7-E8922CE34030}" type="slidenum">
               <a:rPr b="0" lang="en-US" sz="1400" spc="-1" strike="noStrike">
                 <a:solidFill>
                   <a:srgbClr val="000000"/>
                 </a:solidFill>
                 <a:latin typeface="DejaVu Serif"/>
               </a:rPr>
-              <a:t>&lt;footer&gt;</a:t>
-            </a:r>
+              <a:t>&lt;number&gt;</a:t>
+            </a:fld>
             <a:endParaRPr b="0" lang="en-US" sz="1400" spc="-1" strike="noStrike">
               <a:solidFill>
                 <a:srgbClr val="000000"/>
@@ -1074,13 +793,13 @@
             <a:spLocks noGrp="1"/>
           </p:cNvSpPr>
           <p:nvPr>
-            <p:ph type="sldNum" idx="3"/>
+            <p:ph type="dt" idx="3"/>
           </p:nvPr>
         </p:nvSpPr>
         <p:spPr>
           <a:xfrm>
-            <a:off x="7227360" y="5165280"/>
-            <a:ext cx="2348280" cy="390600"/>
+            <a:off x="504000" y="5165280"/>
+            <a:ext cx="2347920" cy="390240"/>
           </a:xfrm>
           <a:prstGeom prst="rect">
             <a:avLst/>
@@ -1095,7 +814,7 @@
             <a:noAutofit/>
           </a:bodyPr>
           <a:lstStyle>
-            <a:lvl1pPr indent="0" algn="r">
+            <a:lvl1pPr indent="0">
               <a:buNone/>
               <a:defRPr b="0" lang="en-US" sz="1400" spc="-1" strike="noStrike">
                 <a:solidFill>
@@ -1106,18 +825,18 @@
             </a:lvl1pPr>
           </a:lstStyle>
           <a:p>
-            <a:pPr indent="0" algn="r">
+            <a:pPr indent="0">
               <a:buNone/>
             </a:pPr>
-            <a:fld id="{3557D6D2-8B89-4C2B-9311-AD818218FEDC}" type="slidenum">
+            <a:r>
               <a:rPr b="0" lang="en-US" sz="1400" spc="-1" strike="noStrike">
                 <a:solidFill>
                   <a:srgbClr val="000000"/>
                 </a:solidFill>
                 <a:latin typeface="DejaVu Serif"/>
               </a:rPr>
-              <a:t>&lt;number&gt;</a:t>
-            </a:fld>
+              <a:t>&lt;date/time&gt;</a:t>
+            </a:r>
             <a:endParaRPr b="0" lang="en-US" sz="1400" spc="-1" strike="noStrike">
               <a:solidFill>
                 <a:srgbClr val="000000"/>
@@ -1132,7 +851,510 @@
   <p:clrMap bg1="lt1" bg2="lt2" tx1="dk1" tx2="dk2" accent1="accent1" accent2="accent2" accent3="accent3" accent4="accent4" accent5="accent5" accent6="accent6" hlink="hlink" folHlink="folHlink"/>
   <p:sldLayoutIdLst>
     <p:sldLayoutId id="2147483649" r:id="rId2"/>
-    <p:sldLayoutId id="2147483650" r:id="rId3"/>
+  </p:sldLayoutIdLst>
+</p:sldMaster>
+</file>
+
+<file path=ppt/slideMasters/slideMaster2.xml><?xml version="1.0" encoding="utf-8"?>
+<p:sldMaster xmlns:a="http://schemas.openxmlformats.org/drawingml/2006/main" xmlns:p="http://schemas.openxmlformats.org/presentationml/2006/main" xmlns:r="http://schemas.openxmlformats.org/officeDocument/2006/relationships" xmlns:p14="http://schemas.microsoft.com/office/powerpoint/2010/main" xmlns:p15="http://schemas.microsoft.com/office/powerpoint/2012/main" xmlns:mc="http://schemas.openxmlformats.org/markup-compatibility/2006">
+  <p:cSld>
+    <p:spTree>
+      <p:nvGrpSpPr>
+        <p:cNvPr id="1" name=""/>
+        <p:cNvGrpSpPr/>
+        <p:nvPr/>
+      </p:nvGrpSpPr>
+      <p:grpSpPr>
+        <a:xfrm>
+          <a:off x="0" y="0"/>
+          <a:ext cx="0" cy="0"/>
+          <a:chOff x="0" y="0"/>
+          <a:chExt cx="0" cy="0"/>
+        </a:xfrm>
+      </p:grpSpPr>
+      <p:sp>
+        <p:nvSpPr>
+          <p:cNvPr id="7" name="PlaceHolder 1"/>
+          <p:cNvSpPr>
+            <a:spLocks noGrp="1"/>
+          </p:cNvSpPr>
+          <p:nvPr>
+            <p:ph type="title"/>
+          </p:nvPr>
+        </p:nvSpPr>
+        <p:spPr>
+          <a:xfrm>
+            <a:off x="504000" y="226080"/>
+            <a:ext cx="9071280" cy="946080"/>
+          </a:xfrm>
+          <a:prstGeom prst="rect">
+            <a:avLst/>
+          </a:prstGeom>
+          <a:noFill/>
+          <a:ln w="0">
+            <a:noFill/>
+          </a:ln>
+        </p:spPr>
+        <p:txBody>
+          <a:bodyPr lIns="0" rIns="0" tIns="0" bIns="0" anchor="ctr">
+            <a:noAutofit/>
+          </a:bodyPr>
+          <a:p>
+            <a:pPr indent="0">
+              <a:buNone/>
+            </a:pPr>
+            <a:r>
+              <a:rPr b="0" lang="en-US" sz="1800" spc="-1" strike="noStrike">
+                <a:solidFill>
+                  <a:srgbClr val="000000"/>
+                </a:solidFill>
+                <a:latin typeface="DejaVu Sans"/>
+              </a:rPr>
+              <a:t>Click to edit the title text format</a:t>
+            </a:r>
+            <a:endParaRPr b="0" lang="en-US" sz="1800" spc="-1" strike="noStrike">
+              <a:solidFill>
+                <a:srgbClr val="000000"/>
+              </a:solidFill>
+              <a:latin typeface="DejaVu Sans"/>
+            </a:endParaRPr>
+          </a:p>
+        </p:txBody>
+      </p:sp>
+      <p:sp>
+        <p:nvSpPr>
+          <p:cNvPr id="8" name="PlaceHolder 2"/>
+          <p:cNvSpPr>
+            <a:spLocks noGrp="1"/>
+          </p:cNvSpPr>
+          <p:nvPr>
+            <p:ph type="ftr" idx="4"/>
+          </p:nvPr>
+        </p:nvSpPr>
+        <p:spPr>
+          <a:xfrm>
+            <a:off x="3447360" y="5165280"/>
+            <a:ext cx="3194640" cy="390240"/>
+          </a:xfrm>
+          <a:prstGeom prst="rect">
+            <a:avLst/>
+          </a:prstGeom>
+          <a:noFill/>
+          <a:ln w="0">
+            <a:noFill/>
+          </a:ln>
+        </p:spPr>
+        <p:txBody>
+          <a:bodyPr lIns="0" rIns="0" tIns="0" bIns="0" anchor="t">
+            <a:noAutofit/>
+          </a:bodyPr>
+          <a:lstStyle>
+            <a:lvl1pPr indent="0" algn="ctr">
+              <a:lnSpc>
+                <a:spcPct val="100000"/>
+              </a:lnSpc>
+              <a:buNone/>
+              <a:tabLst>
+                <a:tab algn="l" pos="0"/>
+              </a:tabLst>
+              <a:defRPr b="0" lang="en-US" sz="1400" spc="-1" strike="noStrike">
+                <a:solidFill>
+                  <a:srgbClr val="000000"/>
+                </a:solidFill>
+                <a:latin typeface="DejaVu Serif"/>
+              </a:defRPr>
+            </a:lvl1pPr>
+          </a:lstStyle>
+          <a:p>
+            <a:pPr indent="0" algn="ctr">
+              <a:lnSpc>
+                <a:spcPct val="100000"/>
+              </a:lnSpc>
+              <a:buNone/>
+              <a:tabLst>
+                <a:tab algn="l" pos="0"/>
+              </a:tabLst>
+            </a:pPr>
+            <a:r>
+              <a:rPr b="0" lang="en-US" sz="1400" spc="-1" strike="noStrike">
+                <a:solidFill>
+                  <a:srgbClr val="000000"/>
+                </a:solidFill>
+                <a:latin typeface="DejaVu Serif"/>
+              </a:rPr>
+              <a:t>&lt;footer&gt;</a:t>
+            </a:r>
+            <a:endParaRPr b="0" lang="en-US" sz="1400" spc="-1" strike="noStrike">
+              <a:solidFill>
+                <a:srgbClr val="000000"/>
+              </a:solidFill>
+              <a:latin typeface="DejaVu Serif"/>
+            </a:endParaRPr>
+          </a:p>
+        </p:txBody>
+      </p:sp>
+      <p:sp>
+        <p:nvSpPr>
+          <p:cNvPr id="9" name="PlaceHolder 3"/>
+          <p:cNvSpPr>
+            <a:spLocks noGrp="1"/>
+          </p:cNvSpPr>
+          <p:nvPr>
+            <p:ph type="sldNum" idx="5"/>
+          </p:nvPr>
+        </p:nvSpPr>
+        <p:spPr>
+          <a:xfrm>
+            <a:off x="7227360" y="5165280"/>
+            <a:ext cx="2347920" cy="390240"/>
+          </a:xfrm>
+          <a:prstGeom prst="rect">
+            <a:avLst/>
+          </a:prstGeom>
+          <a:noFill/>
+          <a:ln w="0">
+            <a:noFill/>
+          </a:ln>
+        </p:spPr>
+        <p:txBody>
+          <a:bodyPr lIns="0" rIns="0" tIns="0" bIns="0" anchor="t">
+            <a:noAutofit/>
+          </a:bodyPr>
+          <a:lstStyle>
+            <a:lvl1pPr indent="0" algn="r">
+              <a:lnSpc>
+                <a:spcPct val="100000"/>
+              </a:lnSpc>
+              <a:buNone/>
+              <a:tabLst>
+                <a:tab algn="l" pos="0"/>
+              </a:tabLst>
+              <a:defRPr b="0" lang="en-US" sz="1400" spc="-1" strike="noStrike">
+                <a:solidFill>
+                  <a:srgbClr val="000000"/>
+                </a:solidFill>
+                <a:latin typeface="DejaVu Serif"/>
+              </a:defRPr>
+            </a:lvl1pPr>
+          </a:lstStyle>
+          <a:p>
+            <a:pPr indent="0" algn="r">
+              <a:lnSpc>
+                <a:spcPct val="100000"/>
+              </a:lnSpc>
+              <a:buNone/>
+              <a:tabLst>
+                <a:tab algn="l" pos="0"/>
+              </a:tabLst>
+            </a:pPr>
+            <a:fld id="{8B965480-FC0F-4D53-8C19-8D21616C3F41}" type="slidenum">
+              <a:rPr b="0" lang="en-US" sz="1400" spc="-1" strike="noStrike">
+                <a:solidFill>
+                  <a:srgbClr val="000000"/>
+                </a:solidFill>
+                <a:latin typeface="DejaVu Serif"/>
+              </a:rPr>
+              <a:t>&lt;number&gt;</a:t>
+            </a:fld>
+            <a:endParaRPr b="0" lang="en-US" sz="1400" spc="-1" strike="noStrike">
+              <a:solidFill>
+                <a:srgbClr val="000000"/>
+              </a:solidFill>
+              <a:latin typeface="DejaVu Serif"/>
+            </a:endParaRPr>
+          </a:p>
+        </p:txBody>
+      </p:sp>
+      <p:sp>
+        <p:nvSpPr>
+          <p:cNvPr id="10" name="PlaceHolder 4"/>
+          <p:cNvSpPr>
+            <a:spLocks noGrp="1"/>
+          </p:cNvSpPr>
+          <p:nvPr>
+            <p:ph type="dt" idx="6"/>
+          </p:nvPr>
+        </p:nvSpPr>
+        <p:spPr>
+          <a:xfrm>
+            <a:off x="504000" y="5165280"/>
+            <a:ext cx="2347920" cy="390240"/>
+          </a:xfrm>
+          <a:prstGeom prst="rect">
+            <a:avLst/>
+          </a:prstGeom>
+          <a:noFill/>
+          <a:ln w="0">
+            <a:noFill/>
+          </a:ln>
+        </p:spPr>
+        <p:txBody>
+          <a:bodyPr lIns="0" rIns="0" tIns="0" bIns="0" anchor="t">
+            <a:noAutofit/>
+          </a:bodyPr>
+          <a:lstStyle>
+            <a:lvl1pPr indent="0">
+              <a:buNone/>
+              <a:defRPr b="0" lang="en-US" sz="1400" spc="-1" strike="noStrike">
+                <a:solidFill>
+                  <a:srgbClr val="000000"/>
+                </a:solidFill>
+                <a:latin typeface="DejaVu Serif"/>
+              </a:defRPr>
+            </a:lvl1pPr>
+          </a:lstStyle>
+          <a:p>
+            <a:pPr indent="0">
+              <a:buNone/>
+            </a:pPr>
+            <a:r>
+              <a:rPr b="0" lang="en-US" sz="1400" spc="-1" strike="noStrike">
+                <a:solidFill>
+                  <a:srgbClr val="000000"/>
+                </a:solidFill>
+                <a:latin typeface="DejaVu Serif"/>
+              </a:rPr>
+              <a:t>&lt;date/time&gt;</a:t>
+            </a:r>
+            <a:endParaRPr b="0" lang="en-US" sz="1400" spc="-1" strike="noStrike">
+              <a:solidFill>
+                <a:srgbClr val="000000"/>
+              </a:solidFill>
+              <a:latin typeface="DejaVu Serif"/>
+            </a:endParaRPr>
+          </a:p>
+        </p:txBody>
+      </p:sp>
+      <p:sp>
+        <p:nvSpPr>
+          <p:cNvPr id="11" name="PlaceHolder 5"/>
+          <p:cNvSpPr>
+            <a:spLocks noGrp="1"/>
+          </p:cNvSpPr>
+          <p:nvPr>
+            <p:ph type="body"/>
+          </p:nvPr>
+        </p:nvSpPr>
+        <p:spPr>
+          <a:xfrm>
+            <a:off x="504000" y="1326600"/>
+            <a:ext cx="9072000" cy="3288600"/>
+          </a:xfrm>
+          <a:prstGeom prst="rect">
+            <a:avLst/>
+          </a:prstGeom>
+          <a:noFill/>
+          <a:ln w="0">
+            <a:noFill/>
+          </a:ln>
+        </p:spPr>
+        <p:txBody>
+          <a:bodyPr lIns="0" rIns="0" tIns="0" bIns="0" anchor="t">
+            <a:normAutofit/>
+          </a:bodyPr>
+          <a:p>
+            <a:pPr marL="432000" indent="-324000">
+              <a:spcBef>
+                <a:spcPts val="1417"/>
+              </a:spcBef>
+              <a:buClr>
+                <a:srgbClr val="000000"/>
+              </a:buClr>
+              <a:buSzPct val="45000"/>
+              <a:buFont typeface="Wingdings" charset="2"/>
+              <a:buChar char=""/>
+            </a:pPr>
+            <a:r>
+              <a:rPr b="0" lang="en-US" sz="3200" spc="-1" strike="noStrike">
+                <a:solidFill>
+                  <a:srgbClr val="000000"/>
+                </a:solidFill>
+                <a:latin typeface="DejaVu Sans"/>
+              </a:rPr>
+              <a:t>Click to edit the outline text format</a:t>
+            </a:r>
+            <a:endParaRPr b="0" lang="en-US" sz="3200" spc="-1" strike="noStrike">
+              <a:solidFill>
+                <a:srgbClr val="000000"/>
+              </a:solidFill>
+              <a:latin typeface="DejaVu Sans"/>
+            </a:endParaRPr>
+          </a:p>
+          <a:p>
+            <a:pPr lvl="1" marL="864000" indent="-324000">
+              <a:spcBef>
+                <a:spcPts val="1134"/>
+              </a:spcBef>
+              <a:buClr>
+                <a:srgbClr val="000000"/>
+              </a:buClr>
+              <a:buSzPct val="75000"/>
+              <a:buFont typeface="Symbol" charset="2"/>
+              <a:buChar char=""/>
+            </a:pPr>
+            <a:r>
+              <a:rPr b="0" lang="en-US" sz="2800" spc="-1" strike="noStrike">
+                <a:solidFill>
+                  <a:srgbClr val="000000"/>
+                </a:solidFill>
+                <a:latin typeface="DejaVu Sans"/>
+              </a:rPr>
+              <a:t>Second Outline Level</a:t>
+            </a:r>
+            <a:endParaRPr b="0" lang="en-US" sz="2800" spc="-1" strike="noStrike">
+              <a:solidFill>
+                <a:srgbClr val="000000"/>
+              </a:solidFill>
+              <a:latin typeface="DejaVu Sans"/>
+            </a:endParaRPr>
+          </a:p>
+          <a:p>
+            <a:pPr lvl="2" marL="1296000" indent="-288000">
+              <a:spcBef>
+                <a:spcPts val="850"/>
+              </a:spcBef>
+              <a:buClr>
+                <a:srgbClr val="000000"/>
+              </a:buClr>
+              <a:buSzPct val="45000"/>
+              <a:buFont typeface="Wingdings" charset="2"/>
+              <a:buChar char=""/>
+            </a:pPr>
+            <a:r>
+              <a:rPr b="0" lang="en-US" sz="2400" spc="-1" strike="noStrike">
+                <a:solidFill>
+                  <a:srgbClr val="000000"/>
+                </a:solidFill>
+                <a:latin typeface="DejaVu Sans"/>
+              </a:rPr>
+              <a:t>Third Outline Level</a:t>
+            </a:r>
+            <a:endParaRPr b="0" lang="en-US" sz="2400" spc="-1" strike="noStrike">
+              <a:solidFill>
+                <a:srgbClr val="000000"/>
+              </a:solidFill>
+              <a:latin typeface="DejaVu Sans"/>
+            </a:endParaRPr>
+          </a:p>
+          <a:p>
+            <a:pPr lvl="3" marL="1728000" indent="-216000">
+              <a:spcBef>
+                <a:spcPts val="567"/>
+              </a:spcBef>
+              <a:buClr>
+                <a:srgbClr val="000000"/>
+              </a:buClr>
+              <a:buSzPct val="75000"/>
+              <a:buFont typeface="Symbol" charset="2"/>
+              <a:buChar char=""/>
+            </a:pPr>
+            <a:r>
+              <a:rPr b="0" lang="en-US" sz="2000" spc="-1" strike="noStrike">
+                <a:solidFill>
+                  <a:srgbClr val="000000"/>
+                </a:solidFill>
+                <a:latin typeface="DejaVu Sans"/>
+              </a:rPr>
+              <a:t>Fourth Outline Level</a:t>
+            </a:r>
+            <a:endParaRPr b="0" lang="en-US" sz="2000" spc="-1" strike="noStrike">
+              <a:solidFill>
+                <a:srgbClr val="000000"/>
+              </a:solidFill>
+              <a:latin typeface="DejaVu Sans"/>
+            </a:endParaRPr>
+          </a:p>
+          <a:p>
+            <a:pPr lvl="4" marL="2160000" indent="-216000">
+              <a:spcBef>
+                <a:spcPts val="283"/>
+              </a:spcBef>
+              <a:buClr>
+                <a:srgbClr val="000000"/>
+              </a:buClr>
+              <a:buSzPct val="45000"/>
+              <a:buFont typeface="Wingdings" charset="2"/>
+              <a:buChar char=""/>
+            </a:pPr>
+            <a:r>
+              <a:rPr b="0" lang="en-US" sz="2000" spc="-1" strike="noStrike">
+                <a:solidFill>
+                  <a:srgbClr val="000000"/>
+                </a:solidFill>
+                <a:latin typeface="DejaVu Sans"/>
+              </a:rPr>
+              <a:t>Fifth Outline Level</a:t>
+            </a:r>
+            <a:endParaRPr b="0" lang="en-US" sz="2000" spc="-1" strike="noStrike">
+              <a:solidFill>
+                <a:srgbClr val="000000"/>
+              </a:solidFill>
+              <a:latin typeface="DejaVu Sans"/>
+            </a:endParaRPr>
+          </a:p>
+          <a:p>
+            <a:pPr lvl="5" marL="2592000" indent="-216000">
+              <a:spcBef>
+                <a:spcPts val="283"/>
+              </a:spcBef>
+              <a:buClr>
+                <a:srgbClr val="000000"/>
+              </a:buClr>
+              <a:buSzPct val="45000"/>
+              <a:buFont typeface="Wingdings" charset="2"/>
+              <a:buChar char=""/>
+            </a:pPr>
+            <a:r>
+              <a:rPr b="0" lang="en-US" sz="2000" spc="-1" strike="noStrike">
+                <a:solidFill>
+                  <a:srgbClr val="000000"/>
+                </a:solidFill>
+                <a:latin typeface="DejaVu Sans"/>
+              </a:rPr>
+              <a:t>Sixth Outline Level</a:t>
+            </a:r>
+            <a:endParaRPr b="0" lang="en-US" sz="2000" spc="-1" strike="noStrike">
+              <a:solidFill>
+                <a:srgbClr val="000000"/>
+              </a:solidFill>
+              <a:latin typeface="DejaVu Sans"/>
+            </a:endParaRPr>
+          </a:p>
+          <a:p>
+            <a:pPr lvl="6" marL="3024000" indent="-216000">
+              <a:spcBef>
+                <a:spcPts val="283"/>
+              </a:spcBef>
+              <a:buClr>
+                <a:srgbClr val="000000"/>
+              </a:buClr>
+              <a:buSzPct val="45000"/>
+              <a:buFont typeface="Wingdings" charset="2"/>
+              <a:buChar char=""/>
+            </a:pPr>
+            <a:r>
+              <a:rPr b="0" lang="en-US" sz="2000" spc="-1" strike="noStrike">
+                <a:solidFill>
+                  <a:srgbClr val="000000"/>
+                </a:solidFill>
+                <a:latin typeface="DejaVu Sans"/>
+              </a:rPr>
+              <a:t>Seventh Outline Level</a:t>
+            </a:r>
+            <a:endParaRPr b="0" lang="en-US" sz="2000" spc="-1" strike="noStrike">
+              <a:solidFill>
+                <a:srgbClr val="000000"/>
+              </a:solidFill>
+              <a:latin typeface="DejaVu Sans"/>
+            </a:endParaRPr>
+          </a:p>
+        </p:txBody>
+      </p:sp>
+    </p:spTree>
+  </p:cSld>
+  <p:clrMap bg1="lt1" bg2="lt2" tx1="dk1" tx2="dk2" accent1="accent1" accent2="accent2" accent3="accent3" accent4="accent4" accent5="accent5" accent6="accent6" hlink="hlink" folHlink="folHlink"/>
+  <p:sldLayoutIdLst>
+    <p:sldLayoutId id="2147483651" r:id="rId2"/>
   </p:sldLayoutIdLst>
 </p:sldMaster>
 </file>
@@ -1156,7 +1378,7 @@
       </p:grpSpPr>
       <p:sp>
         <p:nvSpPr>
-          <p:cNvPr id="9" name="PlaceHolder 1"/>
+          <p:cNvPr id="14" name="PlaceHolder 1"/>
           <p:cNvSpPr>
             <a:spLocks noGrp="1"/>
           </p:cNvSpPr>
@@ -1167,7 +1389,7 @@
         <p:spPr>
           <a:xfrm>
             <a:off x="540000" y="2160000"/>
-            <a:ext cx="9071640" cy="946440"/>
+            <a:ext cx="9071280" cy="946080"/>
           </a:xfrm>
           <a:prstGeom prst="rect">
             <a:avLst/>
@@ -1183,7 +1405,13 @@
           </a:bodyPr>
           <a:p>
             <a:pPr indent="0" algn="ctr">
+              <a:lnSpc>
+                <a:spcPct val="100000"/>
+              </a:lnSpc>
               <a:buNone/>
+              <a:tabLst>
+                <a:tab algn="l" pos="0"/>
+              </a:tabLst>
             </a:pPr>
             <a:r>
               <a:rPr b="0" lang="en-US" sz="4400" spc="-1" strike="noStrike">
@@ -1242,7 +1470,7 @@
       </p:grpSpPr>
       <p:pic>
         <p:nvPicPr>
-          <p:cNvPr id="22" name="" descr=""/>
+          <p:cNvPr id="27" name="" descr=""/>
           <p:cNvPicPr/>
           <p:nvPr/>
         </p:nvPicPr>
@@ -1253,7 +1481,7 @@
         <p:spPr>
           <a:xfrm>
             <a:off x="2160000" y="0"/>
-            <a:ext cx="5940000" cy="5940000"/>
+            <a:ext cx="5939640" cy="5939640"/>
           </a:xfrm>
           <a:prstGeom prst="rect">
             <a:avLst/>
@@ -1302,7 +1530,7 @@
       </p:grpSpPr>
       <p:pic>
         <p:nvPicPr>
-          <p:cNvPr id="10" name="" descr=""/>
+          <p:cNvPr id="15" name="" descr=""/>
           <p:cNvPicPr/>
           <p:nvPr/>
         </p:nvPicPr>
@@ -1313,7 +1541,7 @@
         <p:spPr>
           <a:xfrm>
             <a:off x="900000" y="-360000"/>
-            <a:ext cx="8353440" cy="6255000"/>
+            <a:ext cx="8353080" cy="6254640"/>
           </a:xfrm>
           <a:prstGeom prst="rect">
             <a:avLst/>
@@ -1355,7 +1583,7 @@
       </p:grpSpPr>
       <p:pic>
         <p:nvPicPr>
-          <p:cNvPr id="11" name="" descr=""/>
+          <p:cNvPr id="16" name="" descr=""/>
           <p:cNvPicPr/>
           <p:nvPr/>
         </p:nvPicPr>
@@ -1366,7 +1594,7 @@
         <p:spPr>
           <a:xfrm>
             <a:off x="5760000" y="82800"/>
-            <a:ext cx="2257200" cy="2257200"/>
+            <a:ext cx="2256840" cy="2256840"/>
           </a:xfrm>
           <a:prstGeom prst="rect">
             <a:avLst/>
@@ -1378,7 +1606,7 @@
       </p:pic>
       <p:pic>
         <p:nvPicPr>
-          <p:cNvPr id="12" name="" descr=""/>
+          <p:cNvPr id="17" name="" descr=""/>
           <p:cNvPicPr/>
           <p:nvPr/>
         </p:nvPicPr>
@@ -1389,7 +1617,7 @@
         <p:spPr>
           <a:xfrm>
             <a:off x="6660000" y="2520000"/>
-            <a:ext cx="3240000" cy="3240000"/>
+            <a:ext cx="3239640" cy="3239640"/>
           </a:xfrm>
           <a:prstGeom prst="rect">
             <a:avLst/>
@@ -1401,7 +1629,7 @@
       </p:pic>
       <p:pic>
         <p:nvPicPr>
-          <p:cNvPr id="13" name="" descr=""/>
+          <p:cNvPr id="18" name="" descr=""/>
           <p:cNvPicPr/>
           <p:nvPr/>
         </p:nvPicPr>
@@ -1412,7 +1640,7 @@
         <p:spPr>
           <a:xfrm>
             <a:off x="360000" y="540000"/>
-            <a:ext cx="4680000" cy="4680000"/>
+            <a:ext cx="4679640" cy="4679640"/>
           </a:xfrm>
           <a:prstGeom prst="rect">
             <a:avLst/>
@@ -1454,7 +1682,7 @@
       </p:grpSpPr>
       <p:pic>
         <p:nvPicPr>
-          <p:cNvPr id="14" name="" descr=""/>
+          <p:cNvPr id="19" name="" descr=""/>
           <p:cNvPicPr/>
           <p:nvPr/>
         </p:nvPicPr>
@@ -1465,7 +1693,7 @@
         <p:spPr>
           <a:xfrm>
             <a:off x="1080000" y="0"/>
-            <a:ext cx="3240000" cy="3240000"/>
+            <a:ext cx="3239640" cy="3239640"/>
           </a:xfrm>
           <a:prstGeom prst="rect">
             <a:avLst/>
@@ -1477,7 +1705,7 @@
       </p:pic>
       <p:pic>
         <p:nvPicPr>
-          <p:cNvPr id="15" name="" descr=""/>
+          <p:cNvPr id="20" name="" descr=""/>
           <p:cNvPicPr/>
           <p:nvPr/>
         </p:nvPicPr>
@@ -1488,7 +1716,7 @@
         <p:spPr>
           <a:xfrm>
             <a:off x="5220000" y="1080000"/>
-            <a:ext cx="4140000" cy="4140000"/>
+            <a:ext cx="4139640" cy="4139640"/>
           </a:xfrm>
           <a:prstGeom prst="rect">
             <a:avLst/>
@@ -1530,7 +1758,7 @@
       </p:grpSpPr>
       <p:pic>
         <p:nvPicPr>
-          <p:cNvPr id="16" name="" descr=""/>
+          <p:cNvPr id="21" name="" descr=""/>
           <p:cNvPicPr/>
           <p:nvPr/>
         </p:nvPicPr>
@@ -1540,8 +1768,31 @@
         </p:blipFill>
         <p:spPr>
           <a:xfrm>
-            <a:off x="540000" y="540000"/>
-            <a:ext cx="4680000" cy="4680000"/>
+            <a:off x="0" y="360000"/>
+            <a:ext cx="5219640" cy="5219640"/>
+          </a:xfrm>
+          <a:prstGeom prst="rect">
+            <a:avLst/>
+          </a:prstGeom>
+          <a:ln w="0">
+            <a:noFill/>
+          </a:ln>
+        </p:spPr>
+      </p:pic>
+      <p:pic>
+        <p:nvPicPr>
+          <p:cNvPr id="22" name="" descr=""/>
+          <p:cNvPicPr/>
+          <p:nvPr/>
+        </p:nvPicPr>
+        <p:blipFill>
+          <a:blip r:embed="rId2"/>
+          <a:stretch/>
+        </p:blipFill>
+        <p:spPr>
+          <a:xfrm>
+            <a:off x="5580000" y="-2520000"/>
+            <a:ext cx="10979640" cy="10979640"/>
           </a:xfrm>
           <a:prstGeom prst="rect">
             <a:avLst/>
@@ -1583,7 +1834,7 @@
       </p:grpSpPr>
       <p:pic>
         <p:nvPicPr>
-          <p:cNvPr id="17" name="" descr=""/>
+          <p:cNvPr id="23" name="" descr=""/>
           <p:cNvPicPr/>
           <p:nvPr/>
         </p:nvPicPr>
@@ -1593,8 +1844,8 @@
         </p:blipFill>
         <p:spPr>
           <a:xfrm>
-            <a:off x="0" y="0"/>
-            <a:ext cx="10080000" cy="5739120"/>
+            <a:off x="540000" y="540000"/>
+            <a:ext cx="4679640" cy="4679640"/>
           </a:xfrm>
           <a:prstGeom prst="rect">
             <a:avLst/>
@@ -1636,7 +1887,7 @@
       </p:grpSpPr>
       <p:pic>
         <p:nvPicPr>
-          <p:cNvPr id="18" name="" descr=""/>
+          <p:cNvPr id="24" name="" descr=""/>
           <p:cNvPicPr/>
           <p:nvPr/>
         </p:nvPicPr>
@@ -1647,7 +1898,7 @@
         <p:spPr>
           <a:xfrm>
             <a:off x="2520000" y="720000"/>
-            <a:ext cx="4992480" cy="4380840"/>
+            <a:ext cx="4992120" cy="4380480"/>
           </a:xfrm>
           <a:prstGeom prst="rect">
             <a:avLst/>
@@ -1689,7 +1940,7 @@
       </p:grpSpPr>
       <p:pic>
         <p:nvPicPr>
-          <p:cNvPr id="19" name="" descr=""/>
+          <p:cNvPr id="25" name="" descr=""/>
           <p:cNvPicPr/>
           <p:nvPr/>
         </p:nvPicPr>
@@ -1699,31 +1950,8 @@
         </p:blipFill>
         <p:spPr>
           <a:xfrm>
-            <a:off x="0" y="360000"/>
-            <a:ext cx="5220000" cy="5220000"/>
-          </a:xfrm>
-          <a:prstGeom prst="rect">
-            <a:avLst/>
-          </a:prstGeom>
-          <a:ln w="0">
-            <a:noFill/>
-          </a:ln>
-        </p:spPr>
-      </p:pic>
-      <p:pic>
-        <p:nvPicPr>
-          <p:cNvPr id="20" name="" descr=""/>
-          <p:cNvPicPr/>
-          <p:nvPr/>
-        </p:nvPicPr>
-        <p:blipFill>
-          <a:blip r:embed="rId2"/>
-          <a:stretch/>
-        </p:blipFill>
-        <p:spPr>
-          <a:xfrm>
-            <a:off x="5580000" y="-2520000"/>
-            <a:ext cx="10980000" cy="10980000"/>
+            <a:off x="0" y="0"/>
+            <a:ext cx="10079640" cy="5738760"/>
           </a:xfrm>
           <a:prstGeom prst="rect">
             <a:avLst/>
@@ -1765,7 +1993,7 @@
       </p:grpSpPr>
       <p:pic>
         <p:nvPicPr>
-          <p:cNvPr id="21" name="" descr=""/>
+          <p:cNvPr id="26" name="" descr=""/>
           <p:cNvPicPr/>
           <p:nvPr/>
         </p:nvPicPr>
@@ -1776,7 +2004,7 @@
         <p:spPr>
           <a:xfrm>
             <a:off x="2602800" y="180000"/>
-            <a:ext cx="5317200" cy="5317200"/>
+            <a:ext cx="5316840" cy="5316840"/>
           </a:xfrm>
           <a:prstGeom prst="rect">
             <a:avLst/>
@@ -1903,4 +2131,110 @@
     </a:fmtScheme>
   </a:themeElements>
 </a:theme>
+</file>
+
+<file path=ppt/theme/theme2.xml><?xml version="1.0" encoding="utf-8"?>
+<a:theme xmlns:a="http://schemas.openxmlformats.org/drawingml/2006/main" xmlns:r="http://schemas.openxmlformats.org/officeDocument/2006/relationships" name="Office">
+  <a:themeElements>
+    <a:clrScheme name="LibreOffice">
+      <a:dk1>
+        <a:srgbClr val="000000"/>
+      </a:dk1>
+      <a:lt1>
+        <a:srgbClr val="ffffff"/>
+      </a:lt1>
+      <a:dk2>
+        <a:srgbClr val="000000"/>
+      </a:dk2>
+      <a:lt2>
+        <a:srgbClr val="ffffff"/>
+      </a:lt2>
+      <a:accent1>
+        <a:srgbClr val="18a303"/>
+      </a:accent1>
+      <a:accent2>
+        <a:srgbClr val="0369a3"/>
+      </a:accent2>
+      <a:accent3>
+        <a:srgbClr val="a33e03"/>
+      </a:accent3>
+      <a:accent4>
+        <a:srgbClr val="8e03a3"/>
+      </a:accent4>
+      <a:accent5>
+        <a:srgbClr val="c99c00"/>
+      </a:accent5>
+      <a:accent6>
+        <a:srgbClr val="c9211e"/>
+      </a:accent6>
+      <a:hlink>
+        <a:srgbClr val="0000ee"/>
+      </a:hlink>
+      <a:folHlink>
+        <a:srgbClr val="551a8b"/>
+      </a:folHlink>
+    </a:clrScheme>
+    <a:fontScheme name="Office">
+      <a:majorFont>
+        <a:latin typeface="Arial" pitchFamily="0" charset="1"/>
+        <a:ea typeface="DejaVu Sans" pitchFamily="0" charset="1"/>
+        <a:cs typeface="DejaVu Sans" pitchFamily="0" charset="1"/>
+      </a:majorFont>
+      <a:minorFont>
+        <a:latin typeface="Arial" pitchFamily="0" charset="1"/>
+        <a:ea typeface="DejaVu Sans" pitchFamily="0" charset="1"/>
+        <a:cs typeface="DejaVu Sans" pitchFamily="0" charset="1"/>
+      </a:minorFont>
+    </a:fontScheme>
+    <a:fmtScheme>
+      <a:fillStyleLst>
+        <a:solidFill>
+          <a:schemeClr val="phClr"/>
+        </a:solidFill>
+        <a:solidFill>
+          <a:schemeClr val="phClr"/>
+        </a:solidFill>
+        <a:solidFill>
+          <a:schemeClr val="phClr"/>
+        </a:solidFill>
+      </a:fillStyleLst>
+      <a:lnStyleLst>
+        <a:ln w="6350" cap="flat" cmpd="sng" algn="ctr">
+          <a:prstDash val="solid"/>
+          <a:miter/>
+        </a:ln>
+        <a:ln w="6350" cap="flat" cmpd="sng" algn="ctr">
+          <a:prstDash val="solid"/>
+          <a:miter/>
+        </a:ln>
+        <a:ln w="6350" cap="flat" cmpd="sng" algn="ctr">
+          <a:prstDash val="solid"/>
+          <a:miter/>
+        </a:ln>
+      </a:lnStyleLst>
+      <a:effectStyleLst>
+        <a:effectStyle>
+          <a:effectLst/>
+        </a:effectStyle>
+        <a:effectStyle>
+          <a:effectLst/>
+        </a:effectStyle>
+        <a:effectStyle>
+          <a:effectLst/>
+        </a:effectStyle>
+      </a:effectStyleLst>
+      <a:bgFillStyleLst>
+        <a:solidFill>
+          <a:schemeClr val="phClr"/>
+        </a:solidFill>
+        <a:solidFill>
+          <a:schemeClr val="phClr"/>
+        </a:solidFill>
+        <a:solidFill>
+          <a:schemeClr val="phClr"/>
+        </a:solidFill>
+      </a:bgFillStyleLst>
+    </a:fmtScheme>
+  </a:themeElements>
+</a:theme>
 </file>
</xml_diff>